<commit_message>
Shorten yield checker automaton figure
</commit_message>
<xml_diff>
--- a/YieldTypeCheckingAutomaton.pptx
+++ b/YieldTypeCheckingAutomaton.pptx
@@ -2,12 +2,12 @@
 <file path=ppt/presentation.xml><?xml version="1.0" encoding="utf-8"?>
 <p:presentation xmlns:a="http://schemas.openxmlformats.org/drawingml/2006/main" xmlns:r="http://schemas.openxmlformats.org/officeDocument/2006/relationships" xmlns:p="http://schemas.openxmlformats.org/presentationml/2006/main" saveSubsetFonts="1">
   <p:sldMasterIdLst>
-    <p:sldMasterId id="2147483696" r:id="rId1"/>
+    <p:sldMasterId id="2147483744" r:id="rId1"/>
   </p:sldMasterIdLst>
   <p:sldIdLst>
     <p:sldId id="256" r:id="rId2"/>
   </p:sldIdLst>
-  <p:sldSz cx="8229600" cy="4572000"/>
+  <p:sldSz cx="8229600" cy="3292475"/>
   <p:notesSz cx="6858000" cy="9144000"/>
   <p:defaultTextStyle>
     <a:defPPr>
@@ -141,15 +141,15 @@
         </p:nvSpPr>
         <p:spPr>
           <a:xfrm>
-            <a:off x="1028700" y="748242"/>
-            <a:ext cx="6172200" cy="1591733"/>
+            <a:off x="1028700" y="538838"/>
+            <a:ext cx="6172200" cy="1146269"/>
           </a:xfrm>
         </p:spPr>
         <p:txBody>
           <a:bodyPr anchor="b"/>
           <a:lstStyle>
             <a:lvl1pPr algn="ctr">
-              <a:defRPr sz="4000"/>
+              <a:defRPr sz="2881"/>
             </a:lvl1pPr>
           </a:lstStyle>
           <a:p>
@@ -173,8 +173,8 @@
         </p:nvSpPr>
         <p:spPr>
           <a:xfrm>
-            <a:off x="1028700" y="2401359"/>
-            <a:ext cx="6172200" cy="1103841"/>
+            <a:off x="1028700" y="1729312"/>
+            <a:ext cx="6172200" cy="794919"/>
           </a:xfrm>
         </p:spPr>
         <p:txBody>
@@ -182,39 +182,39 @@
           <a:lstStyle>
             <a:lvl1pPr marL="0" indent="0" algn="ctr">
               <a:buNone/>
-              <a:defRPr sz="1600"/>
+              <a:defRPr sz="1152"/>
             </a:lvl1pPr>
-            <a:lvl2pPr marL="304815" indent="0" algn="ctr">
-              <a:buNone/>
-              <a:defRPr sz="1333"/>
+            <a:lvl2pPr marL="219502" indent="0" algn="ctr">
+              <a:buNone/>
+              <a:defRPr sz="960"/>
             </a:lvl2pPr>
-            <a:lvl3pPr marL="609630" indent="0" algn="ctr">
-              <a:buNone/>
-              <a:defRPr sz="1200"/>
+            <a:lvl3pPr marL="439003" indent="0" algn="ctr">
+              <a:buNone/>
+              <a:defRPr sz="864"/>
             </a:lvl3pPr>
-            <a:lvl4pPr marL="914446" indent="0" algn="ctr">
-              <a:buNone/>
-              <a:defRPr sz="1067"/>
+            <a:lvl4pPr marL="658505" indent="0" algn="ctr">
+              <a:buNone/>
+              <a:defRPr sz="768"/>
             </a:lvl4pPr>
-            <a:lvl5pPr marL="1219261" indent="0" algn="ctr">
-              <a:buNone/>
-              <a:defRPr sz="1067"/>
+            <a:lvl5pPr marL="878007" indent="0" algn="ctr">
+              <a:buNone/>
+              <a:defRPr sz="768"/>
             </a:lvl5pPr>
-            <a:lvl6pPr marL="1524076" indent="0" algn="ctr">
-              <a:buNone/>
-              <a:defRPr sz="1067"/>
+            <a:lvl6pPr marL="1097509" indent="0" algn="ctr">
+              <a:buNone/>
+              <a:defRPr sz="768"/>
             </a:lvl6pPr>
-            <a:lvl7pPr marL="1828891" indent="0" algn="ctr">
-              <a:buNone/>
-              <a:defRPr sz="1067"/>
+            <a:lvl7pPr marL="1317010" indent="0" algn="ctr">
+              <a:buNone/>
+              <a:defRPr sz="768"/>
             </a:lvl7pPr>
-            <a:lvl8pPr marL="2133707" indent="0" algn="ctr">
-              <a:buNone/>
-              <a:defRPr sz="1067"/>
+            <a:lvl8pPr marL="1536512" indent="0" algn="ctr">
+              <a:buNone/>
+              <a:defRPr sz="768"/>
             </a:lvl8pPr>
-            <a:lvl9pPr marL="2438522" indent="0" algn="ctr">
-              <a:buNone/>
-              <a:defRPr sz="1067"/>
+            <a:lvl9pPr marL="1756014" indent="0" algn="ctr">
+              <a:buNone/>
+              <a:defRPr sz="768"/>
             </a:lvl9pPr>
           </a:lstStyle>
           <a:p>
@@ -243,7 +243,7 @@
           <a:p>
             <a:fld id="{41A4A113-B247-41BD-913F-6A6C47F4428D}" type="datetimeFigureOut">
               <a:rPr lang="en-US" smtClean="0"/>
-              <a:t>7/5/2014</a:t>
+              <a:t>7/7/2014</a:t>
             </a:fld>
             <a:endParaRPr lang="en-US"/>
           </a:p>
@@ -294,7 +294,7 @@
     </p:spTree>
     <p:extLst>
       <p:ext uri="{BB962C8B-B14F-4D97-AF65-F5344CB8AC3E}">
-        <p14:creationId xmlns:p14="http://schemas.microsoft.com/office/powerpoint/2010/main" val="4057148164"/>
+        <p14:creationId xmlns:p14="http://schemas.microsoft.com/office/powerpoint/2010/main" val="3515465688"/>
       </p:ext>
     </p:extLst>
   </p:cSld>
@@ -413,7 +413,7 @@
           <a:p>
             <a:fld id="{41A4A113-B247-41BD-913F-6A6C47F4428D}" type="datetimeFigureOut">
               <a:rPr lang="en-US" smtClean="0"/>
-              <a:t>7/5/2014</a:t>
+              <a:t>7/7/2014</a:t>
             </a:fld>
             <a:endParaRPr lang="en-US"/>
           </a:p>
@@ -464,7 +464,7 @@
     </p:spTree>
     <p:extLst>
       <p:ext uri="{BB962C8B-B14F-4D97-AF65-F5344CB8AC3E}">
-        <p14:creationId xmlns:p14="http://schemas.microsoft.com/office/powerpoint/2010/main" val="1846838159"/>
+        <p14:creationId xmlns:p14="http://schemas.microsoft.com/office/powerpoint/2010/main" val="957310739"/>
       </p:ext>
     </p:extLst>
   </p:cSld>
@@ -503,8 +503,8 @@
         </p:nvSpPr>
         <p:spPr>
           <a:xfrm>
-            <a:off x="5889307" y="243417"/>
-            <a:ext cx="1774508" cy="3874559"/>
+            <a:off x="5889307" y="175294"/>
+            <a:ext cx="1774508" cy="2790220"/>
           </a:xfrm>
         </p:spPr>
         <p:txBody>
@@ -531,8 +531,8 @@
         </p:nvSpPr>
         <p:spPr>
           <a:xfrm>
-            <a:off x="565785" y="243417"/>
-            <a:ext cx="5220653" cy="3874559"/>
+            <a:off x="565785" y="175294"/>
+            <a:ext cx="5220653" cy="2790220"/>
           </a:xfrm>
         </p:spPr>
         <p:txBody>
@@ -593,7 +593,7 @@
           <a:p>
             <a:fld id="{41A4A113-B247-41BD-913F-6A6C47F4428D}" type="datetimeFigureOut">
               <a:rPr lang="en-US" smtClean="0"/>
-              <a:t>7/5/2014</a:t>
+              <a:t>7/7/2014</a:t>
             </a:fld>
             <a:endParaRPr lang="en-US"/>
           </a:p>
@@ -644,7 +644,7 @@
     </p:spTree>
     <p:extLst>
       <p:ext uri="{BB962C8B-B14F-4D97-AF65-F5344CB8AC3E}">
-        <p14:creationId xmlns:p14="http://schemas.microsoft.com/office/powerpoint/2010/main" val="3893064490"/>
+        <p14:creationId xmlns:p14="http://schemas.microsoft.com/office/powerpoint/2010/main" val="3090903980"/>
       </p:ext>
     </p:extLst>
   </p:cSld>
@@ -763,7 +763,7 @@
           <a:p>
             <a:fld id="{41A4A113-B247-41BD-913F-6A6C47F4428D}" type="datetimeFigureOut">
               <a:rPr lang="en-US" smtClean="0"/>
-              <a:t>7/5/2014</a:t>
+              <a:t>7/7/2014</a:t>
             </a:fld>
             <a:endParaRPr lang="en-US"/>
           </a:p>
@@ -814,7 +814,7 @@
     </p:spTree>
     <p:extLst>
       <p:ext uri="{BB962C8B-B14F-4D97-AF65-F5344CB8AC3E}">
-        <p14:creationId xmlns:p14="http://schemas.microsoft.com/office/powerpoint/2010/main" val="2857234513"/>
+        <p14:creationId xmlns:p14="http://schemas.microsoft.com/office/powerpoint/2010/main" val="2452343385"/>
       </p:ext>
     </p:extLst>
   </p:cSld>
@@ -853,15 +853,15 @@
         </p:nvSpPr>
         <p:spPr>
           <a:xfrm>
-            <a:off x="561499" y="1139826"/>
-            <a:ext cx="7098030" cy="1901825"/>
+            <a:off x="561499" y="820833"/>
+            <a:ext cx="7098030" cy="1369578"/>
           </a:xfrm>
         </p:spPr>
         <p:txBody>
           <a:bodyPr anchor="b"/>
           <a:lstStyle>
             <a:lvl1pPr>
-              <a:defRPr sz="4000"/>
+              <a:defRPr sz="2881"/>
             </a:lvl1pPr>
           </a:lstStyle>
           <a:p>
@@ -885,8 +885,8 @@
         </p:nvSpPr>
         <p:spPr>
           <a:xfrm>
-            <a:off x="561499" y="3059642"/>
-            <a:ext cx="7098030" cy="1000125"/>
+            <a:off x="561499" y="2203367"/>
+            <a:ext cx="7098030" cy="720229"/>
           </a:xfrm>
         </p:spPr>
         <p:txBody>
@@ -894,7 +894,7 @@
           <a:lstStyle>
             <a:lvl1pPr marL="0" indent="0">
               <a:buNone/>
-              <a:defRPr sz="1600">
+              <a:defRPr sz="1152">
                 <a:solidFill>
                   <a:schemeClr val="tx1">
                     <a:tint val="75000"/>
@@ -902,9 +902,9 @@
                 </a:solidFill>
               </a:defRPr>
             </a:lvl1pPr>
-            <a:lvl2pPr marL="304815" indent="0">
-              <a:buNone/>
-              <a:defRPr sz="1333">
+            <a:lvl2pPr marL="219502" indent="0">
+              <a:buNone/>
+              <a:defRPr sz="960">
                 <a:solidFill>
                   <a:schemeClr val="tx1">
                     <a:tint val="75000"/>
@@ -912,9 +912,9 @@
                 </a:solidFill>
               </a:defRPr>
             </a:lvl2pPr>
-            <a:lvl3pPr marL="609630" indent="0">
-              <a:buNone/>
-              <a:defRPr sz="1200">
+            <a:lvl3pPr marL="439003" indent="0">
+              <a:buNone/>
+              <a:defRPr sz="864">
                 <a:solidFill>
                   <a:schemeClr val="tx1">
                     <a:tint val="75000"/>
@@ -922,9 +922,9 @@
                 </a:solidFill>
               </a:defRPr>
             </a:lvl3pPr>
-            <a:lvl4pPr marL="914446" indent="0">
-              <a:buNone/>
-              <a:defRPr sz="1067">
+            <a:lvl4pPr marL="658505" indent="0">
+              <a:buNone/>
+              <a:defRPr sz="768">
                 <a:solidFill>
                   <a:schemeClr val="tx1">
                     <a:tint val="75000"/>
@@ -932,9 +932,9 @@
                 </a:solidFill>
               </a:defRPr>
             </a:lvl4pPr>
-            <a:lvl5pPr marL="1219261" indent="0">
-              <a:buNone/>
-              <a:defRPr sz="1067">
+            <a:lvl5pPr marL="878007" indent="0">
+              <a:buNone/>
+              <a:defRPr sz="768">
                 <a:solidFill>
                   <a:schemeClr val="tx1">
                     <a:tint val="75000"/>
@@ -942,9 +942,9 @@
                 </a:solidFill>
               </a:defRPr>
             </a:lvl5pPr>
-            <a:lvl6pPr marL="1524076" indent="0">
-              <a:buNone/>
-              <a:defRPr sz="1067">
+            <a:lvl6pPr marL="1097509" indent="0">
+              <a:buNone/>
+              <a:defRPr sz="768">
                 <a:solidFill>
                   <a:schemeClr val="tx1">
                     <a:tint val="75000"/>
@@ -952,9 +952,9 @@
                 </a:solidFill>
               </a:defRPr>
             </a:lvl6pPr>
-            <a:lvl7pPr marL="1828891" indent="0">
-              <a:buNone/>
-              <a:defRPr sz="1067">
+            <a:lvl7pPr marL="1317010" indent="0">
+              <a:buNone/>
+              <a:defRPr sz="768">
                 <a:solidFill>
                   <a:schemeClr val="tx1">
                     <a:tint val="75000"/>
@@ -962,9 +962,9 @@
                 </a:solidFill>
               </a:defRPr>
             </a:lvl7pPr>
-            <a:lvl8pPr marL="2133707" indent="0">
-              <a:buNone/>
-              <a:defRPr sz="1067">
+            <a:lvl8pPr marL="1536512" indent="0">
+              <a:buNone/>
+              <a:defRPr sz="768">
                 <a:solidFill>
                   <a:schemeClr val="tx1">
                     <a:tint val="75000"/>
@@ -972,9 +972,9 @@
                 </a:solidFill>
               </a:defRPr>
             </a:lvl8pPr>
-            <a:lvl9pPr marL="2438522" indent="0">
-              <a:buNone/>
-              <a:defRPr sz="1067">
+            <a:lvl9pPr marL="1756014" indent="0">
+              <a:buNone/>
+              <a:defRPr sz="768">
                 <a:solidFill>
                   <a:schemeClr val="tx1">
                     <a:tint val="75000"/>
@@ -1009,7 +1009,7 @@
           <a:p>
             <a:fld id="{41A4A113-B247-41BD-913F-6A6C47F4428D}" type="datetimeFigureOut">
               <a:rPr lang="en-US" smtClean="0"/>
-              <a:t>7/5/2014</a:t>
+              <a:t>7/7/2014</a:t>
             </a:fld>
             <a:endParaRPr lang="en-US"/>
           </a:p>
@@ -1060,7 +1060,7 @@
     </p:spTree>
     <p:extLst>
       <p:ext uri="{BB962C8B-B14F-4D97-AF65-F5344CB8AC3E}">
-        <p14:creationId xmlns:p14="http://schemas.microsoft.com/office/powerpoint/2010/main" val="90201848"/>
+        <p14:creationId xmlns:p14="http://schemas.microsoft.com/office/powerpoint/2010/main" val="259761341"/>
       </p:ext>
     </p:extLst>
   </p:cSld>
@@ -1122,8 +1122,8 @@
         </p:nvSpPr>
         <p:spPr>
           <a:xfrm>
-            <a:off x="565785" y="1217083"/>
-            <a:ext cx="3497580" cy="2900892"/>
+            <a:off x="565785" y="876469"/>
+            <a:ext cx="3497580" cy="2089045"/>
           </a:xfrm>
         </p:spPr>
         <p:txBody>
@@ -1179,8 +1179,8 @@
         </p:nvSpPr>
         <p:spPr>
           <a:xfrm>
-            <a:off x="4166235" y="1217083"/>
-            <a:ext cx="3497580" cy="2900892"/>
+            <a:off x="4166235" y="876469"/>
+            <a:ext cx="3497580" cy="2089045"/>
           </a:xfrm>
         </p:spPr>
         <p:txBody>
@@ -1241,7 +1241,7 @@
           <a:p>
             <a:fld id="{41A4A113-B247-41BD-913F-6A6C47F4428D}" type="datetimeFigureOut">
               <a:rPr lang="en-US" smtClean="0"/>
-              <a:t>7/5/2014</a:t>
+              <a:t>7/7/2014</a:t>
             </a:fld>
             <a:endParaRPr lang="en-US"/>
           </a:p>
@@ -1292,7 +1292,7 @@
     </p:spTree>
     <p:extLst>
       <p:ext uri="{BB962C8B-B14F-4D97-AF65-F5344CB8AC3E}">
-        <p14:creationId xmlns:p14="http://schemas.microsoft.com/office/powerpoint/2010/main" val="4211176224"/>
+        <p14:creationId xmlns:p14="http://schemas.microsoft.com/office/powerpoint/2010/main" val="3723894229"/>
       </p:ext>
     </p:extLst>
   </p:cSld>
@@ -1331,8 +1331,8 @@
         </p:nvSpPr>
         <p:spPr>
           <a:xfrm>
-            <a:off x="566857" y="243417"/>
-            <a:ext cx="7098030" cy="883709"/>
+            <a:off x="566857" y="175294"/>
+            <a:ext cx="7098030" cy="636393"/>
           </a:xfrm>
         </p:spPr>
         <p:txBody>
@@ -1359,8 +1359,8 @@
         </p:nvSpPr>
         <p:spPr>
           <a:xfrm>
-            <a:off x="566857" y="1120775"/>
-            <a:ext cx="3481506" cy="549275"/>
+            <a:off x="566857" y="807114"/>
+            <a:ext cx="3481506" cy="395554"/>
           </a:xfrm>
         </p:spPr>
         <p:txBody>
@@ -1368,39 +1368,39 @@
           <a:lstStyle>
             <a:lvl1pPr marL="0" indent="0">
               <a:buNone/>
-              <a:defRPr sz="1600" b="1"/>
+              <a:defRPr sz="1152" b="1"/>
             </a:lvl1pPr>
-            <a:lvl2pPr marL="304815" indent="0">
-              <a:buNone/>
-              <a:defRPr sz="1333" b="1"/>
+            <a:lvl2pPr marL="219502" indent="0">
+              <a:buNone/>
+              <a:defRPr sz="960" b="1"/>
             </a:lvl2pPr>
-            <a:lvl3pPr marL="609630" indent="0">
-              <a:buNone/>
-              <a:defRPr sz="1200" b="1"/>
+            <a:lvl3pPr marL="439003" indent="0">
+              <a:buNone/>
+              <a:defRPr sz="864" b="1"/>
             </a:lvl3pPr>
-            <a:lvl4pPr marL="914446" indent="0">
-              <a:buNone/>
-              <a:defRPr sz="1067" b="1"/>
+            <a:lvl4pPr marL="658505" indent="0">
+              <a:buNone/>
+              <a:defRPr sz="768" b="1"/>
             </a:lvl4pPr>
-            <a:lvl5pPr marL="1219261" indent="0">
-              <a:buNone/>
-              <a:defRPr sz="1067" b="1"/>
+            <a:lvl5pPr marL="878007" indent="0">
+              <a:buNone/>
+              <a:defRPr sz="768" b="1"/>
             </a:lvl5pPr>
-            <a:lvl6pPr marL="1524076" indent="0">
-              <a:buNone/>
-              <a:defRPr sz="1067" b="1"/>
+            <a:lvl6pPr marL="1097509" indent="0">
+              <a:buNone/>
+              <a:defRPr sz="768" b="1"/>
             </a:lvl6pPr>
-            <a:lvl7pPr marL="1828891" indent="0">
-              <a:buNone/>
-              <a:defRPr sz="1067" b="1"/>
+            <a:lvl7pPr marL="1317010" indent="0">
+              <a:buNone/>
+              <a:defRPr sz="768" b="1"/>
             </a:lvl7pPr>
-            <a:lvl8pPr marL="2133707" indent="0">
-              <a:buNone/>
-              <a:defRPr sz="1067" b="1"/>
+            <a:lvl8pPr marL="1536512" indent="0">
+              <a:buNone/>
+              <a:defRPr sz="768" b="1"/>
             </a:lvl8pPr>
-            <a:lvl9pPr marL="2438522" indent="0">
-              <a:buNone/>
-              <a:defRPr sz="1067" b="1"/>
+            <a:lvl9pPr marL="1756014" indent="0">
+              <a:buNone/>
+              <a:defRPr sz="768" b="1"/>
             </a:lvl9pPr>
           </a:lstStyle>
           <a:p>
@@ -1424,8 +1424,8 @@
         </p:nvSpPr>
         <p:spPr>
           <a:xfrm>
-            <a:off x="566857" y="1670050"/>
-            <a:ext cx="3481506" cy="2456392"/>
+            <a:off x="566857" y="1202668"/>
+            <a:ext cx="3481506" cy="1768943"/>
           </a:xfrm>
         </p:spPr>
         <p:txBody>
@@ -1481,8 +1481,8 @@
         </p:nvSpPr>
         <p:spPr>
           <a:xfrm>
-            <a:off x="4166235" y="1120775"/>
-            <a:ext cx="3498652" cy="549275"/>
+            <a:off x="4166235" y="807114"/>
+            <a:ext cx="3498652" cy="395554"/>
           </a:xfrm>
         </p:spPr>
         <p:txBody>
@@ -1490,39 +1490,39 @@
           <a:lstStyle>
             <a:lvl1pPr marL="0" indent="0">
               <a:buNone/>
-              <a:defRPr sz="1600" b="1"/>
+              <a:defRPr sz="1152" b="1"/>
             </a:lvl1pPr>
-            <a:lvl2pPr marL="304815" indent="0">
-              <a:buNone/>
-              <a:defRPr sz="1333" b="1"/>
+            <a:lvl2pPr marL="219502" indent="0">
+              <a:buNone/>
+              <a:defRPr sz="960" b="1"/>
             </a:lvl2pPr>
-            <a:lvl3pPr marL="609630" indent="0">
-              <a:buNone/>
-              <a:defRPr sz="1200" b="1"/>
+            <a:lvl3pPr marL="439003" indent="0">
+              <a:buNone/>
+              <a:defRPr sz="864" b="1"/>
             </a:lvl3pPr>
-            <a:lvl4pPr marL="914446" indent="0">
-              <a:buNone/>
-              <a:defRPr sz="1067" b="1"/>
+            <a:lvl4pPr marL="658505" indent="0">
+              <a:buNone/>
+              <a:defRPr sz="768" b="1"/>
             </a:lvl4pPr>
-            <a:lvl5pPr marL="1219261" indent="0">
-              <a:buNone/>
-              <a:defRPr sz="1067" b="1"/>
+            <a:lvl5pPr marL="878007" indent="0">
+              <a:buNone/>
+              <a:defRPr sz="768" b="1"/>
             </a:lvl5pPr>
-            <a:lvl6pPr marL="1524076" indent="0">
-              <a:buNone/>
-              <a:defRPr sz="1067" b="1"/>
+            <a:lvl6pPr marL="1097509" indent="0">
+              <a:buNone/>
+              <a:defRPr sz="768" b="1"/>
             </a:lvl6pPr>
-            <a:lvl7pPr marL="1828891" indent="0">
-              <a:buNone/>
-              <a:defRPr sz="1067" b="1"/>
+            <a:lvl7pPr marL="1317010" indent="0">
+              <a:buNone/>
+              <a:defRPr sz="768" b="1"/>
             </a:lvl7pPr>
-            <a:lvl8pPr marL="2133707" indent="0">
-              <a:buNone/>
-              <a:defRPr sz="1067" b="1"/>
+            <a:lvl8pPr marL="1536512" indent="0">
+              <a:buNone/>
+              <a:defRPr sz="768" b="1"/>
             </a:lvl8pPr>
-            <a:lvl9pPr marL="2438522" indent="0">
-              <a:buNone/>
-              <a:defRPr sz="1067" b="1"/>
+            <a:lvl9pPr marL="1756014" indent="0">
+              <a:buNone/>
+              <a:defRPr sz="768" b="1"/>
             </a:lvl9pPr>
           </a:lstStyle>
           <a:p>
@@ -1546,8 +1546,8 @@
         </p:nvSpPr>
         <p:spPr>
           <a:xfrm>
-            <a:off x="4166235" y="1670050"/>
-            <a:ext cx="3498652" cy="2456392"/>
+            <a:off x="4166235" y="1202668"/>
+            <a:ext cx="3498652" cy="1768943"/>
           </a:xfrm>
         </p:spPr>
         <p:txBody>
@@ -1608,7 +1608,7 @@
           <a:p>
             <a:fld id="{41A4A113-B247-41BD-913F-6A6C47F4428D}" type="datetimeFigureOut">
               <a:rPr lang="en-US" smtClean="0"/>
-              <a:t>7/5/2014</a:t>
+              <a:t>7/7/2014</a:t>
             </a:fld>
             <a:endParaRPr lang="en-US"/>
           </a:p>
@@ -1659,7 +1659,7 @@
     </p:spTree>
     <p:extLst>
       <p:ext uri="{BB962C8B-B14F-4D97-AF65-F5344CB8AC3E}">
-        <p14:creationId xmlns:p14="http://schemas.microsoft.com/office/powerpoint/2010/main" val="2830987784"/>
+        <p14:creationId xmlns:p14="http://schemas.microsoft.com/office/powerpoint/2010/main" val="3219465674"/>
       </p:ext>
     </p:extLst>
   </p:cSld>
@@ -1726,7 +1726,7 @@
           <a:p>
             <a:fld id="{41A4A113-B247-41BD-913F-6A6C47F4428D}" type="datetimeFigureOut">
               <a:rPr lang="en-US" smtClean="0"/>
-              <a:t>7/5/2014</a:t>
+              <a:t>7/7/2014</a:t>
             </a:fld>
             <a:endParaRPr lang="en-US"/>
           </a:p>
@@ -1777,7 +1777,7 @@
     </p:spTree>
     <p:extLst>
       <p:ext uri="{BB962C8B-B14F-4D97-AF65-F5344CB8AC3E}">
-        <p14:creationId xmlns:p14="http://schemas.microsoft.com/office/powerpoint/2010/main" val="381525028"/>
+        <p14:creationId xmlns:p14="http://schemas.microsoft.com/office/powerpoint/2010/main" val="2405476990"/>
       </p:ext>
     </p:extLst>
   </p:cSld>
@@ -1821,7 +1821,7 @@
           <a:p>
             <a:fld id="{41A4A113-B247-41BD-913F-6A6C47F4428D}" type="datetimeFigureOut">
               <a:rPr lang="en-US" smtClean="0"/>
-              <a:t>7/5/2014</a:t>
+              <a:t>7/7/2014</a:t>
             </a:fld>
             <a:endParaRPr lang="en-US"/>
           </a:p>
@@ -1872,7 +1872,7 @@
     </p:spTree>
     <p:extLst>
       <p:ext uri="{BB962C8B-B14F-4D97-AF65-F5344CB8AC3E}">
-        <p14:creationId xmlns:p14="http://schemas.microsoft.com/office/powerpoint/2010/main" val="1420031235"/>
+        <p14:creationId xmlns:p14="http://schemas.microsoft.com/office/powerpoint/2010/main" val="385527042"/>
       </p:ext>
     </p:extLst>
   </p:cSld>
@@ -1911,15 +1911,15 @@
         </p:nvSpPr>
         <p:spPr>
           <a:xfrm>
-            <a:off x="566857" y="304800"/>
-            <a:ext cx="2654260" cy="1066800"/>
+            <a:off x="566857" y="219498"/>
+            <a:ext cx="2654260" cy="768244"/>
           </a:xfrm>
         </p:spPr>
         <p:txBody>
           <a:bodyPr anchor="b"/>
           <a:lstStyle>
             <a:lvl1pPr>
-              <a:defRPr sz="2133"/>
+              <a:defRPr sz="1536"/>
             </a:lvl1pPr>
           </a:lstStyle>
           <a:p>
@@ -1943,39 +1943,39 @@
         </p:nvSpPr>
         <p:spPr>
           <a:xfrm>
-            <a:off x="3498652" y="658284"/>
-            <a:ext cx="4166235" cy="3249083"/>
+            <a:off x="3498652" y="474056"/>
+            <a:ext cx="4166235" cy="2339791"/>
           </a:xfrm>
         </p:spPr>
         <p:txBody>
           <a:bodyPr/>
           <a:lstStyle>
             <a:lvl1pPr>
-              <a:defRPr sz="2133"/>
+              <a:defRPr sz="1536"/>
             </a:lvl1pPr>
             <a:lvl2pPr>
-              <a:defRPr sz="1867"/>
+              <a:defRPr sz="1344"/>
             </a:lvl2pPr>
             <a:lvl3pPr>
-              <a:defRPr sz="1600"/>
+              <a:defRPr sz="1152"/>
             </a:lvl3pPr>
             <a:lvl4pPr>
-              <a:defRPr sz="1333"/>
+              <a:defRPr sz="960"/>
             </a:lvl4pPr>
             <a:lvl5pPr>
-              <a:defRPr sz="1333"/>
+              <a:defRPr sz="960"/>
             </a:lvl5pPr>
             <a:lvl6pPr>
-              <a:defRPr sz="1333"/>
+              <a:defRPr sz="960"/>
             </a:lvl6pPr>
             <a:lvl7pPr>
-              <a:defRPr sz="1333"/>
+              <a:defRPr sz="960"/>
             </a:lvl7pPr>
             <a:lvl8pPr>
-              <a:defRPr sz="1333"/>
+              <a:defRPr sz="960"/>
             </a:lvl8pPr>
             <a:lvl9pPr>
-              <a:defRPr sz="1333"/>
+              <a:defRPr sz="960"/>
             </a:lvl9pPr>
           </a:lstStyle>
           <a:p>
@@ -2028,8 +2028,8 @@
         </p:nvSpPr>
         <p:spPr>
           <a:xfrm>
-            <a:off x="566857" y="1371600"/>
-            <a:ext cx="2654260" cy="2541059"/>
+            <a:off x="566857" y="987743"/>
+            <a:ext cx="2654260" cy="1829915"/>
           </a:xfrm>
         </p:spPr>
         <p:txBody>
@@ -2037,39 +2037,39 @@
           <a:lstStyle>
             <a:lvl1pPr marL="0" indent="0">
               <a:buNone/>
-              <a:defRPr sz="1067"/>
+              <a:defRPr sz="768"/>
             </a:lvl1pPr>
-            <a:lvl2pPr marL="304815" indent="0">
-              <a:buNone/>
-              <a:defRPr sz="933"/>
+            <a:lvl2pPr marL="219502" indent="0">
+              <a:buNone/>
+              <a:defRPr sz="672"/>
             </a:lvl2pPr>
-            <a:lvl3pPr marL="609630" indent="0">
-              <a:buNone/>
-              <a:defRPr sz="800"/>
+            <a:lvl3pPr marL="439003" indent="0">
+              <a:buNone/>
+              <a:defRPr sz="576"/>
             </a:lvl3pPr>
-            <a:lvl4pPr marL="914446" indent="0">
-              <a:buNone/>
-              <a:defRPr sz="667"/>
+            <a:lvl4pPr marL="658505" indent="0">
+              <a:buNone/>
+              <a:defRPr sz="480"/>
             </a:lvl4pPr>
-            <a:lvl5pPr marL="1219261" indent="0">
-              <a:buNone/>
-              <a:defRPr sz="667"/>
+            <a:lvl5pPr marL="878007" indent="0">
+              <a:buNone/>
+              <a:defRPr sz="480"/>
             </a:lvl5pPr>
-            <a:lvl6pPr marL="1524076" indent="0">
-              <a:buNone/>
-              <a:defRPr sz="667"/>
+            <a:lvl6pPr marL="1097509" indent="0">
+              <a:buNone/>
+              <a:defRPr sz="480"/>
             </a:lvl6pPr>
-            <a:lvl7pPr marL="1828891" indent="0">
-              <a:buNone/>
-              <a:defRPr sz="667"/>
+            <a:lvl7pPr marL="1317010" indent="0">
+              <a:buNone/>
+              <a:defRPr sz="480"/>
             </a:lvl7pPr>
-            <a:lvl8pPr marL="2133707" indent="0">
-              <a:buNone/>
-              <a:defRPr sz="667"/>
+            <a:lvl8pPr marL="1536512" indent="0">
+              <a:buNone/>
+              <a:defRPr sz="480"/>
             </a:lvl8pPr>
-            <a:lvl9pPr marL="2438522" indent="0">
-              <a:buNone/>
-              <a:defRPr sz="667"/>
+            <a:lvl9pPr marL="1756014" indent="0">
+              <a:buNone/>
+              <a:defRPr sz="480"/>
             </a:lvl9pPr>
           </a:lstStyle>
           <a:p>
@@ -2098,7 +2098,7 @@
           <a:p>
             <a:fld id="{41A4A113-B247-41BD-913F-6A6C47F4428D}" type="datetimeFigureOut">
               <a:rPr lang="en-US" smtClean="0"/>
-              <a:t>7/5/2014</a:t>
+              <a:t>7/7/2014</a:t>
             </a:fld>
             <a:endParaRPr lang="en-US"/>
           </a:p>
@@ -2149,7 +2149,7 @@
     </p:spTree>
     <p:extLst>
       <p:ext uri="{BB962C8B-B14F-4D97-AF65-F5344CB8AC3E}">
-        <p14:creationId xmlns:p14="http://schemas.microsoft.com/office/powerpoint/2010/main" val="99317435"/>
+        <p14:creationId xmlns:p14="http://schemas.microsoft.com/office/powerpoint/2010/main" val="1427095810"/>
       </p:ext>
     </p:extLst>
   </p:cSld>
@@ -2188,15 +2188,15 @@
         </p:nvSpPr>
         <p:spPr>
           <a:xfrm>
-            <a:off x="566857" y="304800"/>
-            <a:ext cx="2654260" cy="1066800"/>
+            <a:off x="566857" y="219498"/>
+            <a:ext cx="2654260" cy="768244"/>
           </a:xfrm>
         </p:spPr>
         <p:txBody>
           <a:bodyPr anchor="b"/>
           <a:lstStyle>
             <a:lvl1pPr>
-              <a:defRPr sz="2133"/>
+              <a:defRPr sz="1536"/>
             </a:lvl1pPr>
           </a:lstStyle>
           <a:p>
@@ -2220,8 +2220,8 @@
         </p:nvSpPr>
         <p:spPr>
           <a:xfrm>
-            <a:off x="3498652" y="658284"/>
-            <a:ext cx="4166235" cy="3249083"/>
+            <a:off x="3498652" y="474056"/>
+            <a:ext cx="4166235" cy="2339791"/>
           </a:xfrm>
         </p:spPr>
         <p:txBody>
@@ -2229,39 +2229,39 @@
           <a:lstStyle>
             <a:lvl1pPr marL="0" indent="0">
               <a:buNone/>
-              <a:defRPr sz="2133"/>
+              <a:defRPr sz="1536"/>
             </a:lvl1pPr>
-            <a:lvl2pPr marL="304815" indent="0">
-              <a:buNone/>
-              <a:defRPr sz="1867"/>
+            <a:lvl2pPr marL="219502" indent="0">
+              <a:buNone/>
+              <a:defRPr sz="1344"/>
             </a:lvl2pPr>
-            <a:lvl3pPr marL="609630" indent="0">
-              <a:buNone/>
-              <a:defRPr sz="1600"/>
+            <a:lvl3pPr marL="439003" indent="0">
+              <a:buNone/>
+              <a:defRPr sz="1152"/>
             </a:lvl3pPr>
-            <a:lvl4pPr marL="914446" indent="0">
-              <a:buNone/>
-              <a:defRPr sz="1333"/>
+            <a:lvl4pPr marL="658505" indent="0">
+              <a:buNone/>
+              <a:defRPr sz="960"/>
             </a:lvl4pPr>
-            <a:lvl5pPr marL="1219261" indent="0">
-              <a:buNone/>
-              <a:defRPr sz="1333"/>
+            <a:lvl5pPr marL="878007" indent="0">
+              <a:buNone/>
+              <a:defRPr sz="960"/>
             </a:lvl5pPr>
-            <a:lvl6pPr marL="1524076" indent="0">
-              <a:buNone/>
-              <a:defRPr sz="1333"/>
+            <a:lvl6pPr marL="1097509" indent="0">
+              <a:buNone/>
+              <a:defRPr sz="960"/>
             </a:lvl6pPr>
-            <a:lvl7pPr marL="1828891" indent="0">
-              <a:buNone/>
-              <a:defRPr sz="1333"/>
+            <a:lvl7pPr marL="1317010" indent="0">
+              <a:buNone/>
+              <a:defRPr sz="960"/>
             </a:lvl7pPr>
-            <a:lvl8pPr marL="2133707" indent="0">
-              <a:buNone/>
-              <a:defRPr sz="1333"/>
+            <a:lvl8pPr marL="1536512" indent="0">
+              <a:buNone/>
+              <a:defRPr sz="960"/>
             </a:lvl8pPr>
-            <a:lvl9pPr marL="2438522" indent="0">
-              <a:buNone/>
-              <a:defRPr sz="1333"/>
+            <a:lvl9pPr marL="1756014" indent="0">
+              <a:buNone/>
+              <a:defRPr sz="960"/>
             </a:lvl9pPr>
           </a:lstStyle>
           <a:p>
@@ -2285,8 +2285,8 @@
         </p:nvSpPr>
         <p:spPr>
           <a:xfrm>
-            <a:off x="566857" y="1371600"/>
-            <a:ext cx="2654260" cy="2541059"/>
+            <a:off x="566857" y="987743"/>
+            <a:ext cx="2654260" cy="1829915"/>
           </a:xfrm>
         </p:spPr>
         <p:txBody>
@@ -2294,39 +2294,39 @@
           <a:lstStyle>
             <a:lvl1pPr marL="0" indent="0">
               <a:buNone/>
-              <a:defRPr sz="1067"/>
+              <a:defRPr sz="768"/>
             </a:lvl1pPr>
-            <a:lvl2pPr marL="304815" indent="0">
-              <a:buNone/>
-              <a:defRPr sz="933"/>
+            <a:lvl2pPr marL="219502" indent="0">
+              <a:buNone/>
+              <a:defRPr sz="672"/>
             </a:lvl2pPr>
-            <a:lvl3pPr marL="609630" indent="0">
-              <a:buNone/>
-              <a:defRPr sz="800"/>
+            <a:lvl3pPr marL="439003" indent="0">
+              <a:buNone/>
+              <a:defRPr sz="576"/>
             </a:lvl3pPr>
-            <a:lvl4pPr marL="914446" indent="0">
-              <a:buNone/>
-              <a:defRPr sz="667"/>
+            <a:lvl4pPr marL="658505" indent="0">
+              <a:buNone/>
+              <a:defRPr sz="480"/>
             </a:lvl4pPr>
-            <a:lvl5pPr marL="1219261" indent="0">
-              <a:buNone/>
-              <a:defRPr sz="667"/>
+            <a:lvl5pPr marL="878007" indent="0">
+              <a:buNone/>
+              <a:defRPr sz="480"/>
             </a:lvl5pPr>
-            <a:lvl6pPr marL="1524076" indent="0">
-              <a:buNone/>
-              <a:defRPr sz="667"/>
+            <a:lvl6pPr marL="1097509" indent="0">
+              <a:buNone/>
+              <a:defRPr sz="480"/>
             </a:lvl6pPr>
-            <a:lvl7pPr marL="1828891" indent="0">
-              <a:buNone/>
-              <a:defRPr sz="667"/>
+            <a:lvl7pPr marL="1317010" indent="0">
+              <a:buNone/>
+              <a:defRPr sz="480"/>
             </a:lvl7pPr>
-            <a:lvl8pPr marL="2133707" indent="0">
-              <a:buNone/>
-              <a:defRPr sz="667"/>
+            <a:lvl8pPr marL="1536512" indent="0">
+              <a:buNone/>
+              <a:defRPr sz="480"/>
             </a:lvl8pPr>
-            <a:lvl9pPr marL="2438522" indent="0">
-              <a:buNone/>
-              <a:defRPr sz="667"/>
+            <a:lvl9pPr marL="1756014" indent="0">
+              <a:buNone/>
+              <a:defRPr sz="480"/>
             </a:lvl9pPr>
           </a:lstStyle>
           <a:p>
@@ -2355,7 +2355,7 @@
           <a:p>
             <a:fld id="{41A4A113-B247-41BD-913F-6A6C47F4428D}" type="datetimeFigureOut">
               <a:rPr lang="en-US" smtClean="0"/>
-              <a:t>7/5/2014</a:t>
+              <a:t>7/7/2014</a:t>
             </a:fld>
             <a:endParaRPr lang="en-US"/>
           </a:p>
@@ -2406,7 +2406,7 @@
     </p:spTree>
     <p:extLst>
       <p:ext uri="{BB962C8B-B14F-4D97-AF65-F5344CB8AC3E}">
-        <p14:creationId xmlns:p14="http://schemas.microsoft.com/office/powerpoint/2010/main" val="2261286207"/>
+        <p14:creationId xmlns:p14="http://schemas.microsoft.com/office/powerpoint/2010/main" val="90550972"/>
       </p:ext>
     </p:extLst>
   </p:cSld>
@@ -2450,8 +2450,8 @@
         </p:nvSpPr>
         <p:spPr>
           <a:xfrm>
-            <a:off x="565785" y="243417"/>
-            <a:ext cx="7098030" cy="883709"/>
+            <a:off x="565785" y="175294"/>
+            <a:ext cx="7098030" cy="636393"/>
           </a:xfrm>
           <a:prstGeom prst="rect">
             <a:avLst/>
@@ -2483,8 +2483,8 @@
         </p:nvSpPr>
         <p:spPr>
           <a:xfrm>
-            <a:off x="565785" y="1217083"/>
-            <a:ext cx="7098030" cy="2900892"/>
+            <a:off x="565785" y="876469"/>
+            <a:ext cx="7098030" cy="2089045"/>
           </a:xfrm>
           <a:prstGeom prst="rect">
             <a:avLst/>
@@ -2545,8 +2545,8 @@
         </p:nvSpPr>
         <p:spPr>
           <a:xfrm>
-            <a:off x="565785" y="4237567"/>
-            <a:ext cx="1851660" cy="243417"/>
+            <a:off x="565785" y="3051637"/>
+            <a:ext cx="1851660" cy="175294"/>
           </a:xfrm>
           <a:prstGeom prst="rect">
             <a:avLst/>
@@ -2556,7 +2556,7 @@
           <a:bodyPr vert="horz" lIns="91440" tIns="45720" rIns="91440" bIns="45720" rtlCol="0" anchor="ctr"/>
           <a:lstStyle>
             <a:lvl1pPr algn="l">
-              <a:defRPr sz="800">
+              <a:defRPr sz="576">
                 <a:solidFill>
                   <a:schemeClr val="tx1">
                     <a:tint val="75000"/>
@@ -2568,7 +2568,7 @@
           <a:p>
             <a:fld id="{41A4A113-B247-41BD-913F-6A6C47F4428D}" type="datetimeFigureOut">
               <a:rPr lang="en-US" smtClean="0"/>
-              <a:t>7/5/2014</a:t>
+              <a:t>7/7/2014</a:t>
             </a:fld>
             <a:endParaRPr lang="en-US"/>
           </a:p>
@@ -2586,8 +2586,8 @@
         </p:nvSpPr>
         <p:spPr>
           <a:xfrm>
-            <a:off x="2726055" y="4237567"/>
-            <a:ext cx="2777490" cy="243417"/>
+            <a:off x="2726055" y="3051637"/>
+            <a:ext cx="2777490" cy="175294"/>
           </a:xfrm>
           <a:prstGeom prst="rect">
             <a:avLst/>
@@ -2597,7 +2597,7 @@
           <a:bodyPr vert="horz" lIns="91440" tIns="45720" rIns="91440" bIns="45720" rtlCol="0" anchor="ctr"/>
           <a:lstStyle>
             <a:lvl1pPr algn="ctr">
-              <a:defRPr sz="800">
+              <a:defRPr sz="576">
                 <a:solidFill>
                   <a:schemeClr val="tx1">
                     <a:tint val="75000"/>
@@ -2623,8 +2623,8 @@
         </p:nvSpPr>
         <p:spPr>
           <a:xfrm>
-            <a:off x="5812155" y="4237567"/>
-            <a:ext cx="1851660" cy="243417"/>
+            <a:off x="5812155" y="3051637"/>
+            <a:ext cx="1851660" cy="175294"/>
           </a:xfrm>
           <a:prstGeom prst="rect">
             <a:avLst/>
@@ -2634,7 +2634,7 @@
           <a:bodyPr vert="horz" lIns="91440" tIns="45720" rIns="91440" bIns="45720" rtlCol="0" anchor="ctr"/>
           <a:lstStyle>
             <a:lvl1pPr algn="r">
-              <a:defRPr sz="800">
+              <a:defRPr sz="576">
                 <a:solidFill>
                   <a:schemeClr val="tx1">
                     <a:tint val="75000"/>
@@ -2655,27 +2655,27 @@
     </p:spTree>
     <p:extLst>
       <p:ext uri="{BB962C8B-B14F-4D97-AF65-F5344CB8AC3E}">
-        <p14:creationId xmlns:p14="http://schemas.microsoft.com/office/powerpoint/2010/main" val="109876481"/>
+        <p14:creationId xmlns:p14="http://schemas.microsoft.com/office/powerpoint/2010/main" val="2580203751"/>
       </p:ext>
     </p:extLst>
   </p:cSld>
   <p:clrMap bg1="lt1" tx1="dk1" bg2="lt2" tx2="dk2" accent1="accent1" accent2="accent2" accent3="accent3" accent4="accent4" accent5="accent5" accent6="accent6" hlink="hlink" folHlink="folHlink"/>
   <p:sldLayoutIdLst>
-    <p:sldLayoutId id="2147483697" r:id="rId1"/>
-    <p:sldLayoutId id="2147483698" r:id="rId2"/>
-    <p:sldLayoutId id="2147483699" r:id="rId3"/>
-    <p:sldLayoutId id="2147483700" r:id="rId4"/>
-    <p:sldLayoutId id="2147483701" r:id="rId5"/>
-    <p:sldLayoutId id="2147483702" r:id="rId6"/>
-    <p:sldLayoutId id="2147483703" r:id="rId7"/>
-    <p:sldLayoutId id="2147483704" r:id="rId8"/>
-    <p:sldLayoutId id="2147483705" r:id="rId9"/>
-    <p:sldLayoutId id="2147483706" r:id="rId10"/>
-    <p:sldLayoutId id="2147483707" r:id="rId11"/>
+    <p:sldLayoutId id="2147483745" r:id="rId1"/>
+    <p:sldLayoutId id="2147483746" r:id="rId2"/>
+    <p:sldLayoutId id="2147483747" r:id="rId3"/>
+    <p:sldLayoutId id="2147483748" r:id="rId4"/>
+    <p:sldLayoutId id="2147483749" r:id="rId5"/>
+    <p:sldLayoutId id="2147483750" r:id="rId6"/>
+    <p:sldLayoutId id="2147483751" r:id="rId7"/>
+    <p:sldLayoutId id="2147483752" r:id="rId8"/>
+    <p:sldLayoutId id="2147483753" r:id="rId9"/>
+    <p:sldLayoutId id="2147483754" r:id="rId10"/>
+    <p:sldLayoutId id="2147483755" r:id="rId11"/>
   </p:sldLayoutIdLst>
   <p:txStyles>
     <p:titleStyle>
-      <a:lvl1pPr algn="l" defTabSz="609630" rtl="0" eaLnBrk="1" latinLnBrk="0" hangingPunct="1">
+      <a:lvl1pPr algn="l" defTabSz="439003" rtl="0" eaLnBrk="1" latinLnBrk="0" hangingPunct="1">
         <a:lnSpc>
           <a:spcPct val="90000"/>
         </a:lnSpc>
@@ -2683,7 +2683,7 @@
           <a:spcPct val="0"/>
         </a:spcBef>
         <a:buNone/>
-        <a:defRPr sz="2933" kern="1200">
+        <a:defRPr sz="2112" kern="1200">
           <a:solidFill>
             <a:schemeClr val="tx1"/>
           </a:solidFill>
@@ -2694,16 +2694,16 @@
       </a:lvl1pPr>
     </p:titleStyle>
     <p:bodyStyle>
-      <a:lvl1pPr marL="152408" indent="-152408" algn="l" defTabSz="609630" rtl="0" eaLnBrk="1" latinLnBrk="0" hangingPunct="1">
+      <a:lvl1pPr marL="109751" indent="-109751" algn="l" defTabSz="439003" rtl="0" eaLnBrk="1" latinLnBrk="0" hangingPunct="1">
         <a:lnSpc>
           <a:spcPct val="90000"/>
         </a:lnSpc>
         <a:spcBef>
-          <a:spcPts val="667"/>
+          <a:spcPts val="480"/>
         </a:spcBef>
         <a:buFont typeface="Arial" panose="020B0604020202020204" pitchFamily="34" charset="0"/>
         <a:buChar char="•"/>
-        <a:defRPr sz="1867" kern="1200">
+        <a:defRPr sz="1344" kern="1200">
           <a:solidFill>
             <a:schemeClr val="tx1"/>
           </a:solidFill>
@@ -2712,16 +2712,16 @@
           <a:cs typeface="+mn-cs"/>
         </a:defRPr>
       </a:lvl1pPr>
-      <a:lvl2pPr marL="457223" indent="-152408" algn="l" defTabSz="609630" rtl="0" eaLnBrk="1" latinLnBrk="0" hangingPunct="1">
+      <a:lvl2pPr marL="329253" indent="-109751" algn="l" defTabSz="439003" rtl="0" eaLnBrk="1" latinLnBrk="0" hangingPunct="1">
         <a:lnSpc>
           <a:spcPct val="90000"/>
         </a:lnSpc>
         <a:spcBef>
-          <a:spcPts val="333"/>
+          <a:spcPts val="240"/>
         </a:spcBef>
         <a:buFont typeface="Arial" panose="020B0604020202020204" pitchFamily="34" charset="0"/>
         <a:buChar char="•"/>
-        <a:defRPr sz="1600" kern="1200">
+        <a:defRPr sz="1152" kern="1200">
           <a:solidFill>
             <a:schemeClr val="tx1"/>
           </a:solidFill>
@@ -2730,16 +2730,16 @@
           <a:cs typeface="+mn-cs"/>
         </a:defRPr>
       </a:lvl2pPr>
-      <a:lvl3pPr marL="762038" indent="-152408" algn="l" defTabSz="609630" rtl="0" eaLnBrk="1" latinLnBrk="0" hangingPunct="1">
+      <a:lvl3pPr marL="548754" indent="-109751" algn="l" defTabSz="439003" rtl="0" eaLnBrk="1" latinLnBrk="0" hangingPunct="1">
         <a:lnSpc>
           <a:spcPct val="90000"/>
         </a:lnSpc>
         <a:spcBef>
-          <a:spcPts val="333"/>
+          <a:spcPts val="240"/>
         </a:spcBef>
         <a:buFont typeface="Arial" panose="020B0604020202020204" pitchFamily="34" charset="0"/>
         <a:buChar char="•"/>
-        <a:defRPr sz="1333" kern="1200">
+        <a:defRPr sz="960" kern="1200">
           <a:solidFill>
             <a:schemeClr val="tx1"/>
           </a:solidFill>
@@ -2748,16 +2748,16 @@
           <a:cs typeface="+mn-cs"/>
         </a:defRPr>
       </a:lvl3pPr>
-      <a:lvl4pPr marL="1066853" indent="-152408" algn="l" defTabSz="609630" rtl="0" eaLnBrk="1" latinLnBrk="0" hangingPunct="1">
+      <a:lvl4pPr marL="768256" indent="-109751" algn="l" defTabSz="439003" rtl="0" eaLnBrk="1" latinLnBrk="0" hangingPunct="1">
         <a:lnSpc>
           <a:spcPct val="90000"/>
         </a:lnSpc>
         <a:spcBef>
-          <a:spcPts val="333"/>
+          <a:spcPts val="240"/>
         </a:spcBef>
         <a:buFont typeface="Arial" panose="020B0604020202020204" pitchFamily="34" charset="0"/>
         <a:buChar char="•"/>
-        <a:defRPr sz="1200" kern="1200">
+        <a:defRPr sz="864" kern="1200">
           <a:solidFill>
             <a:schemeClr val="tx1"/>
           </a:solidFill>
@@ -2766,16 +2766,16 @@
           <a:cs typeface="+mn-cs"/>
         </a:defRPr>
       </a:lvl4pPr>
-      <a:lvl5pPr marL="1371669" indent="-152408" algn="l" defTabSz="609630" rtl="0" eaLnBrk="1" latinLnBrk="0" hangingPunct="1">
+      <a:lvl5pPr marL="987758" indent="-109751" algn="l" defTabSz="439003" rtl="0" eaLnBrk="1" latinLnBrk="0" hangingPunct="1">
         <a:lnSpc>
           <a:spcPct val="90000"/>
         </a:lnSpc>
         <a:spcBef>
-          <a:spcPts val="333"/>
+          <a:spcPts val="240"/>
         </a:spcBef>
         <a:buFont typeface="Arial" panose="020B0604020202020204" pitchFamily="34" charset="0"/>
         <a:buChar char="•"/>
-        <a:defRPr sz="1200" kern="1200">
+        <a:defRPr sz="864" kern="1200">
           <a:solidFill>
             <a:schemeClr val="tx1"/>
           </a:solidFill>
@@ -2784,16 +2784,16 @@
           <a:cs typeface="+mn-cs"/>
         </a:defRPr>
       </a:lvl5pPr>
-      <a:lvl6pPr marL="1676484" indent="-152408" algn="l" defTabSz="609630" rtl="0" eaLnBrk="1" latinLnBrk="0" hangingPunct="1">
+      <a:lvl6pPr marL="1207259" indent="-109751" algn="l" defTabSz="439003" rtl="0" eaLnBrk="1" latinLnBrk="0" hangingPunct="1">
         <a:lnSpc>
           <a:spcPct val="90000"/>
         </a:lnSpc>
         <a:spcBef>
-          <a:spcPts val="333"/>
+          <a:spcPts val="240"/>
         </a:spcBef>
         <a:buFont typeface="Arial" panose="020B0604020202020204" pitchFamily="34" charset="0"/>
         <a:buChar char="•"/>
-        <a:defRPr sz="1200" kern="1200">
+        <a:defRPr sz="864" kern="1200">
           <a:solidFill>
             <a:schemeClr val="tx1"/>
           </a:solidFill>
@@ -2802,16 +2802,16 @@
           <a:cs typeface="+mn-cs"/>
         </a:defRPr>
       </a:lvl6pPr>
-      <a:lvl7pPr marL="1981299" indent="-152408" algn="l" defTabSz="609630" rtl="0" eaLnBrk="1" latinLnBrk="0" hangingPunct="1">
+      <a:lvl7pPr marL="1426761" indent="-109751" algn="l" defTabSz="439003" rtl="0" eaLnBrk="1" latinLnBrk="0" hangingPunct="1">
         <a:lnSpc>
           <a:spcPct val="90000"/>
         </a:lnSpc>
         <a:spcBef>
-          <a:spcPts val="333"/>
+          <a:spcPts val="240"/>
         </a:spcBef>
         <a:buFont typeface="Arial" panose="020B0604020202020204" pitchFamily="34" charset="0"/>
         <a:buChar char="•"/>
-        <a:defRPr sz="1200" kern="1200">
+        <a:defRPr sz="864" kern="1200">
           <a:solidFill>
             <a:schemeClr val="tx1"/>
           </a:solidFill>
@@ -2820,16 +2820,16 @@
           <a:cs typeface="+mn-cs"/>
         </a:defRPr>
       </a:lvl7pPr>
-      <a:lvl8pPr marL="2286114" indent="-152408" algn="l" defTabSz="609630" rtl="0" eaLnBrk="1" latinLnBrk="0" hangingPunct="1">
+      <a:lvl8pPr marL="1646263" indent="-109751" algn="l" defTabSz="439003" rtl="0" eaLnBrk="1" latinLnBrk="0" hangingPunct="1">
         <a:lnSpc>
           <a:spcPct val="90000"/>
         </a:lnSpc>
         <a:spcBef>
-          <a:spcPts val="333"/>
+          <a:spcPts val="240"/>
         </a:spcBef>
         <a:buFont typeface="Arial" panose="020B0604020202020204" pitchFamily="34" charset="0"/>
         <a:buChar char="•"/>
-        <a:defRPr sz="1200" kern="1200">
+        <a:defRPr sz="864" kern="1200">
           <a:solidFill>
             <a:schemeClr val="tx1"/>
           </a:solidFill>
@@ -2838,16 +2838,16 @@
           <a:cs typeface="+mn-cs"/>
         </a:defRPr>
       </a:lvl8pPr>
-      <a:lvl9pPr marL="2590930" indent="-152408" algn="l" defTabSz="609630" rtl="0" eaLnBrk="1" latinLnBrk="0" hangingPunct="1">
+      <a:lvl9pPr marL="1865765" indent="-109751" algn="l" defTabSz="439003" rtl="0" eaLnBrk="1" latinLnBrk="0" hangingPunct="1">
         <a:lnSpc>
           <a:spcPct val="90000"/>
         </a:lnSpc>
         <a:spcBef>
-          <a:spcPts val="333"/>
+          <a:spcPts val="240"/>
         </a:spcBef>
         <a:buFont typeface="Arial" panose="020B0604020202020204" pitchFamily="34" charset="0"/>
         <a:buChar char="•"/>
-        <a:defRPr sz="1200" kern="1200">
+        <a:defRPr sz="864" kern="1200">
           <a:solidFill>
             <a:schemeClr val="tx1"/>
           </a:solidFill>
@@ -2861,8 +2861,8 @@
       <a:defPPr>
         <a:defRPr lang="en-US"/>
       </a:defPPr>
-      <a:lvl1pPr marL="0" algn="l" defTabSz="609630" rtl="0" eaLnBrk="1" latinLnBrk="0" hangingPunct="1">
-        <a:defRPr sz="1200" kern="1200">
+      <a:lvl1pPr marL="0" algn="l" defTabSz="439003" rtl="0" eaLnBrk="1" latinLnBrk="0" hangingPunct="1">
+        <a:defRPr sz="864" kern="1200">
           <a:solidFill>
             <a:schemeClr val="tx1"/>
           </a:solidFill>
@@ -2871,8 +2871,8 @@
           <a:cs typeface="+mn-cs"/>
         </a:defRPr>
       </a:lvl1pPr>
-      <a:lvl2pPr marL="304815" algn="l" defTabSz="609630" rtl="0" eaLnBrk="1" latinLnBrk="0" hangingPunct="1">
-        <a:defRPr sz="1200" kern="1200">
+      <a:lvl2pPr marL="219502" algn="l" defTabSz="439003" rtl="0" eaLnBrk="1" latinLnBrk="0" hangingPunct="1">
+        <a:defRPr sz="864" kern="1200">
           <a:solidFill>
             <a:schemeClr val="tx1"/>
           </a:solidFill>
@@ -2881,8 +2881,8 @@
           <a:cs typeface="+mn-cs"/>
         </a:defRPr>
       </a:lvl2pPr>
-      <a:lvl3pPr marL="609630" algn="l" defTabSz="609630" rtl="0" eaLnBrk="1" latinLnBrk="0" hangingPunct="1">
-        <a:defRPr sz="1200" kern="1200">
+      <a:lvl3pPr marL="439003" algn="l" defTabSz="439003" rtl="0" eaLnBrk="1" latinLnBrk="0" hangingPunct="1">
+        <a:defRPr sz="864" kern="1200">
           <a:solidFill>
             <a:schemeClr val="tx1"/>
           </a:solidFill>
@@ -2891,8 +2891,8 @@
           <a:cs typeface="+mn-cs"/>
         </a:defRPr>
       </a:lvl3pPr>
-      <a:lvl4pPr marL="914446" algn="l" defTabSz="609630" rtl="0" eaLnBrk="1" latinLnBrk="0" hangingPunct="1">
-        <a:defRPr sz="1200" kern="1200">
+      <a:lvl4pPr marL="658505" algn="l" defTabSz="439003" rtl="0" eaLnBrk="1" latinLnBrk="0" hangingPunct="1">
+        <a:defRPr sz="864" kern="1200">
           <a:solidFill>
             <a:schemeClr val="tx1"/>
           </a:solidFill>
@@ -2901,8 +2901,8 @@
           <a:cs typeface="+mn-cs"/>
         </a:defRPr>
       </a:lvl4pPr>
-      <a:lvl5pPr marL="1219261" algn="l" defTabSz="609630" rtl="0" eaLnBrk="1" latinLnBrk="0" hangingPunct="1">
-        <a:defRPr sz="1200" kern="1200">
+      <a:lvl5pPr marL="878007" algn="l" defTabSz="439003" rtl="0" eaLnBrk="1" latinLnBrk="0" hangingPunct="1">
+        <a:defRPr sz="864" kern="1200">
           <a:solidFill>
             <a:schemeClr val="tx1"/>
           </a:solidFill>
@@ -2911,8 +2911,8 @@
           <a:cs typeface="+mn-cs"/>
         </a:defRPr>
       </a:lvl5pPr>
-      <a:lvl6pPr marL="1524076" algn="l" defTabSz="609630" rtl="0" eaLnBrk="1" latinLnBrk="0" hangingPunct="1">
-        <a:defRPr sz="1200" kern="1200">
+      <a:lvl6pPr marL="1097509" algn="l" defTabSz="439003" rtl="0" eaLnBrk="1" latinLnBrk="0" hangingPunct="1">
+        <a:defRPr sz="864" kern="1200">
           <a:solidFill>
             <a:schemeClr val="tx1"/>
           </a:solidFill>
@@ -2921,8 +2921,8 @@
           <a:cs typeface="+mn-cs"/>
         </a:defRPr>
       </a:lvl6pPr>
-      <a:lvl7pPr marL="1828891" algn="l" defTabSz="609630" rtl="0" eaLnBrk="1" latinLnBrk="0" hangingPunct="1">
-        <a:defRPr sz="1200" kern="1200">
+      <a:lvl7pPr marL="1317010" algn="l" defTabSz="439003" rtl="0" eaLnBrk="1" latinLnBrk="0" hangingPunct="1">
+        <a:defRPr sz="864" kern="1200">
           <a:solidFill>
             <a:schemeClr val="tx1"/>
           </a:solidFill>
@@ -2931,8 +2931,8 @@
           <a:cs typeface="+mn-cs"/>
         </a:defRPr>
       </a:lvl7pPr>
-      <a:lvl8pPr marL="2133707" algn="l" defTabSz="609630" rtl="0" eaLnBrk="1" latinLnBrk="0" hangingPunct="1">
-        <a:defRPr sz="1200" kern="1200">
+      <a:lvl8pPr marL="1536512" algn="l" defTabSz="439003" rtl="0" eaLnBrk="1" latinLnBrk="0" hangingPunct="1">
+        <a:defRPr sz="864" kern="1200">
           <a:solidFill>
             <a:schemeClr val="tx1"/>
           </a:solidFill>
@@ -2941,8 +2941,8 @@
           <a:cs typeface="+mn-cs"/>
         </a:defRPr>
       </a:lvl8pPr>
-      <a:lvl9pPr marL="2438522" algn="l" defTabSz="609630" rtl="0" eaLnBrk="1" latinLnBrk="0" hangingPunct="1">
-        <a:defRPr sz="1200" kern="1200">
+      <a:lvl9pPr marL="1756014" algn="l" defTabSz="439003" rtl="0" eaLnBrk="1" latinLnBrk="0" hangingPunct="1">
+        <a:defRPr sz="864" kern="1200">
           <a:solidFill>
             <a:schemeClr val="tx1"/>
           </a:solidFill>
@@ -2981,14 +2981,14 @@
         </p:nvSpPr>
         <p:spPr>
           <a:xfrm>
-            <a:off x="1254702" y="3218238"/>
+            <a:off x="1254702" y="2082090"/>
             <a:ext cx="976746" cy="976746"/>
           </a:xfrm>
           <a:prstGeom prst="ellipse">
             <a:avLst/>
           </a:prstGeom>
           <a:noFill/>
-          <a:ln w="19050">
+          <a:ln w="38100">
             <a:solidFill>
               <a:schemeClr val="tx1"/>
             </a:solidFill>
@@ -3015,7 +3015,7 @@
           <a:lstStyle/>
           <a:p>
             <a:pPr algn="ctr"/>
-            <a:endParaRPr lang="en-US"/>
+            <a:endParaRPr lang="en-US" sz="2800"/>
           </a:p>
         </p:txBody>
       </p:sp>
@@ -3027,14 +3027,14 @@
         </p:nvSpPr>
         <p:spPr>
           <a:xfrm>
-            <a:off x="6173412" y="3218238"/>
+            <a:off x="6173412" y="2082090"/>
             <a:ext cx="976746" cy="976746"/>
           </a:xfrm>
           <a:prstGeom prst="ellipse">
             <a:avLst/>
           </a:prstGeom>
           <a:noFill/>
-          <a:ln w="19050">
+          <a:ln w="38100">
             <a:solidFill>
               <a:schemeClr val="tx1"/>
             </a:solidFill>
@@ -3061,7 +3061,7 @@
           <a:lstStyle/>
           <a:p>
             <a:pPr algn="ctr"/>
-            <a:endParaRPr lang="en-US"/>
+            <a:endParaRPr lang="en-US" sz="2800"/>
           </a:p>
         </p:txBody>
       </p:sp>
@@ -3073,14 +3073,14 @@
         </p:nvSpPr>
         <p:spPr>
           <a:xfrm>
-            <a:off x="3616902" y="1016058"/>
+            <a:off x="3616902" y="559179"/>
             <a:ext cx="976746" cy="976746"/>
           </a:xfrm>
           <a:prstGeom prst="ellipse">
             <a:avLst/>
           </a:prstGeom>
           <a:noFill/>
-          <a:ln w="19050">
+          <a:ln w="38100">
             <a:solidFill>
               <a:schemeClr val="tx1"/>
             </a:solidFill>
@@ -3107,32 +3107,32 @@
           <a:lstStyle/>
           <a:p>
             <a:pPr algn="ctr"/>
-            <a:endParaRPr lang="en-US"/>
+            <a:endParaRPr lang="en-US" sz="2800"/>
           </a:p>
         </p:txBody>
       </p:sp>
       <p:cxnSp>
         <p:nvCxnSpPr>
-          <p:cNvPr id="13" name="Straight Arrow Connector 12"/>
+          <p:cNvPr id="27" name="Straight Arrow Connector 26"/>
           <p:cNvCxnSpPr>
-            <a:stCxn id="6" idx="3"/>
-            <a:endCxn id="5" idx="5"/>
+            <a:stCxn id="5" idx="0"/>
+            <a:endCxn id="7" idx="2"/>
           </p:cNvCxnSpPr>
           <p:nvPr/>
         </p:nvCxnSpPr>
         <p:spPr>
-          <a:xfrm flipH="1">
-            <a:off x="2088407" y="4051943"/>
-            <a:ext cx="4228046" cy="0"/>
+          <a:xfrm flipV="1">
+            <a:off x="1743079" y="1047552"/>
+            <a:ext cx="1873827" cy="1034538"/>
           </a:xfrm>
           <a:prstGeom prst="straightConnector1">
             <a:avLst/>
           </a:prstGeom>
-          <a:ln w="19050">
+          <a:ln w="28575">
             <a:solidFill>
               <a:schemeClr val="tx1"/>
             </a:solidFill>
-            <a:tailEnd type="triangle"/>
+            <a:tailEnd type="triangle" w="lg" len="lg"/>
           </a:ln>
         </p:spPr>
         <p:style>
@@ -3152,26 +3152,26 @@
       </p:cxnSp>
       <p:cxnSp>
         <p:nvCxnSpPr>
-          <p:cNvPr id="15" name="Straight Arrow Connector 14"/>
+          <p:cNvPr id="29" name="Straight Arrow Connector 28"/>
           <p:cNvCxnSpPr>
-            <a:stCxn id="5" idx="7"/>
-            <a:endCxn id="6" idx="1"/>
+            <a:stCxn id="7" idx="6"/>
+            <a:endCxn id="6" idx="0"/>
           </p:cNvCxnSpPr>
           <p:nvPr/>
         </p:nvCxnSpPr>
         <p:spPr>
           <a:xfrm>
-            <a:off x="2088407" y="3361279"/>
-            <a:ext cx="4228046" cy="0"/>
+            <a:off x="4593652" y="1047552"/>
+            <a:ext cx="2068137" cy="1034538"/>
           </a:xfrm>
           <a:prstGeom prst="straightConnector1">
             <a:avLst/>
           </a:prstGeom>
-          <a:ln w="19050">
+          <a:ln w="28575">
             <a:solidFill>
               <a:schemeClr val="tx1"/>
             </a:solidFill>
-            <a:tailEnd type="triangle"/>
+            <a:tailEnd type="triangle" w="lg" len="lg"/>
           </a:ln>
         </p:spPr>
         <p:style>
@@ -3191,13 +3191,247 @@
       </p:cxnSp>
       <p:sp>
         <p:nvSpPr>
-          <p:cNvPr id="23" name="Freeform 22"/>
+          <p:cNvPr id="30" name="TextBox 29"/>
+          <p:cNvSpPr txBox="1"/>
+          <p:nvPr/>
+        </p:nvSpPr>
+        <p:spPr>
+          <a:xfrm>
+            <a:off x="1414278" y="2295003"/>
+            <a:ext cx="688009" cy="523220"/>
+          </a:xfrm>
+          <a:prstGeom prst="rect">
+            <a:avLst/>
+          </a:prstGeom>
+          <a:noFill/>
+        </p:spPr>
+        <p:txBody>
+          <a:bodyPr wrap="none" rtlCol="0">
+            <a:spAutoFit/>
+          </a:bodyPr>
+          <a:lstStyle/>
+          <a:p>
+            <a:r>
+              <a:rPr lang="en-US" sz="2800" dirty="0"/>
+              <a:t>RM</a:t>
+            </a:r>
+          </a:p>
+        </p:txBody>
+      </p:sp>
+      <p:sp>
+        <p:nvSpPr>
+          <p:cNvPr id="31" name="TextBox 30"/>
+          <p:cNvSpPr txBox="1"/>
+          <p:nvPr/>
+        </p:nvSpPr>
+        <p:spPr>
+          <a:xfrm>
+            <a:off x="6343640" y="2295003"/>
+            <a:ext cx="643125" cy="523220"/>
+          </a:xfrm>
+          <a:prstGeom prst="rect">
+            <a:avLst/>
+          </a:prstGeom>
+          <a:noFill/>
+        </p:spPr>
+        <p:txBody>
+          <a:bodyPr wrap="none" rtlCol="0">
+            <a:spAutoFit/>
+          </a:bodyPr>
+          <a:lstStyle/>
+          <a:p>
+            <a:r>
+              <a:rPr lang="en-US" sz="2800" dirty="0"/>
+              <a:t>LM</a:t>
+            </a:r>
+          </a:p>
+        </p:txBody>
+      </p:sp>
+      <p:sp>
+        <p:nvSpPr>
+          <p:cNvPr id="32" name="TextBox 31"/>
+          <p:cNvSpPr txBox="1"/>
+          <p:nvPr/>
+        </p:nvSpPr>
+        <p:spPr>
+          <a:xfrm>
+            <a:off x="3763677" y="771036"/>
+            <a:ext cx="683200" cy="523220"/>
+          </a:xfrm>
+          <a:prstGeom prst="rect">
+            <a:avLst/>
+          </a:prstGeom>
+          <a:noFill/>
+        </p:spPr>
+        <p:txBody>
+          <a:bodyPr wrap="none" rtlCol="0">
+            <a:spAutoFit/>
+          </a:bodyPr>
+          <a:lstStyle/>
+          <a:p>
+            <a:r>
+              <a:rPr lang="en-US" sz="2800" dirty="0"/>
+              <a:t>CM</a:t>
+            </a:r>
+          </a:p>
+        </p:txBody>
+      </p:sp>
+      <p:sp>
+        <p:nvSpPr>
+          <p:cNvPr id="33" name="TextBox 32"/>
+          <p:cNvSpPr txBox="1"/>
+          <p:nvPr/>
+        </p:nvSpPr>
+        <p:spPr>
+          <a:xfrm>
+            <a:off x="68278" y="2347446"/>
+            <a:ext cx="660630" cy="523220"/>
+          </a:xfrm>
+          <a:prstGeom prst="rect">
+            <a:avLst/>
+          </a:prstGeom>
+          <a:noFill/>
+        </p:spPr>
+        <p:txBody>
+          <a:bodyPr wrap="none" rtlCol="0">
+            <a:spAutoFit/>
+          </a:bodyPr>
+          <a:lstStyle/>
+          <a:p>
+            <a:r>
+              <a:rPr lang="en-US" sz="2800" dirty="0"/>
+              <a:t>B,R</a:t>
+            </a:r>
+            <a:endParaRPr lang="en-US" sz="2800" dirty="0"/>
+          </a:p>
+        </p:txBody>
+      </p:sp>
+      <p:sp>
+        <p:nvSpPr>
+          <p:cNvPr id="34" name="TextBox 33"/>
+          <p:cNvSpPr txBox="1"/>
+          <p:nvPr/>
+        </p:nvSpPr>
+        <p:spPr>
+          <a:xfrm>
+            <a:off x="3942922" y="1794354"/>
+            <a:ext cx="417102" cy="523220"/>
+          </a:xfrm>
+          <a:prstGeom prst="rect">
+            <a:avLst/>
+          </a:prstGeom>
+          <a:noFill/>
+        </p:spPr>
+        <p:txBody>
+          <a:bodyPr wrap="none" rtlCol="0">
+            <a:spAutoFit/>
+          </a:bodyPr>
+          <a:lstStyle/>
+          <a:p>
+            <a:r>
+              <a:rPr lang="en-US" sz="2800" dirty="0"/>
+              <a:t>N</a:t>
+            </a:r>
+          </a:p>
+        </p:txBody>
+      </p:sp>
+      <p:sp>
+        <p:nvSpPr>
+          <p:cNvPr id="35" name="TextBox 34"/>
+          <p:cNvSpPr txBox="1"/>
+          <p:nvPr/>
+        </p:nvSpPr>
+        <p:spPr>
+          <a:xfrm>
+            <a:off x="3971776" y="2473674"/>
+            <a:ext cx="359394" cy="523220"/>
+          </a:xfrm>
+          <a:prstGeom prst="rect">
+            <a:avLst/>
+          </a:prstGeom>
+          <a:noFill/>
+        </p:spPr>
+        <p:txBody>
+          <a:bodyPr wrap="none" rtlCol="0">
+            <a:spAutoFit/>
+          </a:bodyPr>
+          <a:lstStyle/>
+          <a:p>
+            <a:r>
+              <a:rPr lang="en-US" sz="2800" dirty="0"/>
+              <a:t>Y</a:t>
+            </a:r>
+          </a:p>
+        </p:txBody>
+      </p:sp>
+      <p:sp>
+        <p:nvSpPr>
+          <p:cNvPr id="36" name="TextBox 35"/>
+          <p:cNvSpPr txBox="1"/>
+          <p:nvPr/>
+        </p:nvSpPr>
+        <p:spPr>
+          <a:xfrm>
+            <a:off x="7696514" y="2347446"/>
+            <a:ext cx="615746" cy="523220"/>
+          </a:xfrm>
+          <a:prstGeom prst="rect">
+            <a:avLst/>
+          </a:prstGeom>
+          <a:noFill/>
+        </p:spPr>
+        <p:txBody>
+          <a:bodyPr wrap="none" rtlCol="0">
+            <a:spAutoFit/>
+          </a:bodyPr>
+          <a:lstStyle/>
+          <a:p>
+            <a:r>
+              <a:rPr lang="en-US" sz="2800" dirty="0"/>
+              <a:t>B,L</a:t>
+            </a:r>
+            <a:endParaRPr lang="en-US" sz="2800" dirty="0"/>
+          </a:p>
+        </p:txBody>
+      </p:sp>
+      <p:sp>
+        <p:nvSpPr>
+          <p:cNvPr id="37" name="TextBox 36"/>
+          <p:cNvSpPr txBox="1"/>
+          <p:nvPr/>
+        </p:nvSpPr>
+        <p:spPr>
+          <a:xfrm>
+            <a:off x="3923969" y="-19294"/>
+            <a:ext cx="393056" cy="523220"/>
+          </a:xfrm>
+          <a:prstGeom prst="rect">
+            <a:avLst/>
+          </a:prstGeom>
+          <a:noFill/>
+        </p:spPr>
+        <p:txBody>
+          <a:bodyPr wrap="none" rtlCol="0">
+            <a:spAutoFit/>
+          </a:bodyPr>
+          <a:lstStyle/>
+          <a:p>
+            <a:r>
+              <a:rPr lang="en-US" sz="2800" dirty="0"/>
+              <a:t>A</a:t>
+            </a:r>
+          </a:p>
+        </p:txBody>
+      </p:sp>
+      <p:sp>
+        <p:nvSpPr>
+          <p:cNvPr id="28" name="Freeform 27"/>
           <p:cNvSpPr/>
           <p:nvPr/>
         </p:nvSpPr>
         <p:spPr>
-          <a:xfrm>
-            <a:off x="690736" y="3114451"/>
+          <a:xfrm rot="16200000" flipH="1">
+            <a:off x="3776457" y="-212446"/>
             <a:ext cx="709443" cy="1248801"/>
           </a:xfrm>
           <a:custGeom>
@@ -3262,11 +3496,11 @@
             </a:pathLst>
           </a:custGeom>
           <a:noFill/>
-          <a:ln w="19050">
+          <a:ln w="28575">
             <a:solidFill>
               <a:schemeClr val="tx1"/>
             </a:solidFill>
-            <a:tailEnd type="triangle"/>
+            <a:tailEnd type="triangle" w="lg" len="lg"/>
           </a:ln>
         </p:spPr>
         <p:style>
@@ -3290,19 +3524,19 @@
           <a:lstStyle/>
           <a:p>
             <a:pPr algn="ctr"/>
-            <a:endParaRPr lang="en-US"/>
-          </a:p>
-        </p:txBody>
-      </p:sp>
-      <p:sp>
-        <p:nvSpPr>
-          <p:cNvPr id="24" name="Freeform 23"/>
+            <a:endParaRPr lang="en-US" sz="2800"/>
+          </a:p>
+        </p:txBody>
+      </p:sp>
+      <p:sp>
+        <p:nvSpPr>
+          <p:cNvPr id="39" name="Freeform 38"/>
           <p:cNvSpPr/>
           <p:nvPr/>
         </p:nvSpPr>
         <p:spPr>
-          <a:xfrm flipH="1">
-            <a:off x="6992476" y="3114451"/>
+          <a:xfrm>
+            <a:off x="682737" y="1978307"/>
             <a:ext cx="709443" cy="1248801"/>
           </a:xfrm>
           <a:custGeom>
@@ -3367,11 +3601,11 @@
             </a:pathLst>
           </a:custGeom>
           <a:noFill/>
-          <a:ln w="19050">
+          <a:ln w="28575">
             <a:solidFill>
               <a:schemeClr val="tx1"/>
             </a:solidFill>
-            <a:tailEnd type="triangle"/>
+            <a:tailEnd type="triangle" w="lg" len="lg"/>
           </a:ln>
         </p:spPr>
         <p:style>
@@ -3395,22 +3629,19 @@
           <a:lstStyle/>
           <a:p>
             <a:pPr algn="ctr"/>
-            <a:r>
-              <a:rPr lang="en-US" dirty="0"/>
-              <a:t>L</a:t>
-            </a:r>
-          </a:p>
-        </p:txBody>
-      </p:sp>
-      <p:sp>
-        <p:nvSpPr>
-          <p:cNvPr id="25" name="Freeform 24"/>
+            <a:endParaRPr lang="en-US" sz="2800"/>
+          </a:p>
+        </p:txBody>
+      </p:sp>
+      <p:sp>
+        <p:nvSpPr>
+          <p:cNvPr id="40" name="Freeform 39"/>
           <p:cNvSpPr/>
           <p:nvPr/>
         </p:nvSpPr>
         <p:spPr>
-          <a:xfrm rot="16200000" flipH="1">
-            <a:off x="3784456" y="192181"/>
+          <a:xfrm flipH="1">
+            <a:off x="6984477" y="1978307"/>
             <a:ext cx="709443" cy="1248801"/>
           </a:xfrm>
           <a:custGeom>
@@ -3475,11 +3706,11 @@
             </a:pathLst>
           </a:custGeom>
           <a:noFill/>
-          <a:ln w="19050">
+          <a:ln w="28575">
             <a:solidFill>
               <a:schemeClr val="tx1"/>
             </a:solidFill>
-            <a:tailEnd type="triangle"/>
+            <a:tailEnd type="triangle" w="lg" len="lg"/>
           </a:ln>
         </p:spPr>
         <p:style>
@@ -3503,32 +3734,32 @@
           <a:lstStyle/>
           <a:p>
             <a:pPr algn="ctr"/>
-            <a:endParaRPr lang="en-US"/>
+            <a:r>
+              <a:rPr lang="en-US" sz="2800" dirty="0"/>
+              <a:t>L</a:t>
+            </a:r>
           </a:p>
         </p:txBody>
       </p:sp>
       <p:cxnSp>
         <p:nvCxnSpPr>
-          <p:cNvPr id="27" name="Straight Arrow Connector 26"/>
-          <p:cNvCxnSpPr>
-            <a:stCxn id="5" idx="0"/>
-            <a:endCxn id="7" idx="2"/>
-          </p:cNvCxnSpPr>
+          <p:cNvPr id="41" name="Straight Arrow Connector 40"/>
+          <p:cNvCxnSpPr/>
           <p:nvPr/>
         </p:nvCxnSpPr>
         <p:spPr>
-          <a:xfrm flipV="1">
-            <a:off x="1743079" y="1504435"/>
-            <a:ext cx="1873827" cy="1713807"/>
+          <a:xfrm flipH="1">
+            <a:off x="2080404" y="2915795"/>
+            <a:ext cx="4228046" cy="0"/>
           </a:xfrm>
           <a:prstGeom prst="straightConnector1">
             <a:avLst/>
           </a:prstGeom>
-          <a:ln w="19050">
+          <a:ln w="28575">
             <a:solidFill>
               <a:schemeClr val="tx1"/>
             </a:solidFill>
-            <a:tailEnd type="triangle"/>
+            <a:tailEnd type="triangle" w="lg" len="lg"/>
           </a:ln>
         </p:spPr>
         <p:style>
@@ -3548,26 +3779,23 @@
       </p:cxnSp>
       <p:cxnSp>
         <p:nvCxnSpPr>
-          <p:cNvPr id="29" name="Straight Arrow Connector 28"/>
-          <p:cNvCxnSpPr>
-            <a:stCxn id="7" idx="6"/>
-            <a:endCxn id="6" idx="0"/>
-          </p:cNvCxnSpPr>
+          <p:cNvPr id="42" name="Straight Arrow Connector 41"/>
+          <p:cNvCxnSpPr/>
           <p:nvPr/>
         </p:nvCxnSpPr>
         <p:spPr>
           <a:xfrm>
-            <a:off x="4593652" y="1504435"/>
-            <a:ext cx="2068137" cy="1713807"/>
+            <a:off x="2080404" y="2225131"/>
+            <a:ext cx="4228046" cy="0"/>
           </a:xfrm>
           <a:prstGeom prst="straightConnector1">
             <a:avLst/>
           </a:prstGeom>
-          <a:ln w="19050">
+          <a:ln w="28575">
             <a:solidFill>
               <a:schemeClr val="tx1"/>
             </a:solidFill>
-            <a:tailEnd type="triangle"/>
+            <a:tailEnd type="triangle" w="lg" len="lg"/>
           </a:ln>
         </p:spPr>
         <p:style>
@@ -3587,14 +3815,14 @@
       </p:cxnSp>
       <p:sp>
         <p:nvSpPr>
-          <p:cNvPr id="30" name="TextBox 29"/>
+          <p:cNvPr id="43" name="TextBox 42"/>
           <p:cNvSpPr txBox="1"/>
           <p:nvPr/>
         </p:nvSpPr>
         <p:spPr>
           <a:xfrm>
-            <a:off x="1468755" y="3500873"/>
-            <a:ext cx="402674" cy="278538"/>
+            <a:off x="86461" y="100630"/>
+            <a:ext cx="3230500" cy="954107"/>
           </a:xfrm>
           <a:prstGeom prst="rect">
             <a:avLst/>
@@ -3608,214 +3836,16 @@
           <a:lstStyle/>
           <a:p>
             <a:r>
-              <a:rPr lang="en-US" dirty="0"/>
-              <a:t>RM</a:t>
-            </a:r>
-          </a:p>
-        </p:txBody>
-      </p:sp>
-      <p:sp>
-        <p:nvSpPr>
-          <p:cNvPr id="31" name="TextBox 30"/>
-          <p:cNvSpPr txBox="1"/>
-          <p:nvPr/>
-        </p:nvSpPr>
-        <p:spPr>
-          <a:xfrm>
-            <a:off x="6459394" y="3500873"/>
-            <a:ext cx="383438" cy="278538"/>
-          </a:xfrm>
-          <a:prstGeom prst="rect">
-            <a:avLst/>
-          </a:prstGeom>
-          <a:noFill/>
-        </p:spPr>
-        <p:txBody>
-          <a:bodyPr wrap="none" rtlCol="0">
-            <a:spAutoFit/>
-          </a:bodyPr>
-          <a:lstStyle/>
-          <a:p>
-            <a:r>
-              <a:rPr lang="en-US" dirty="0"/>
-              <a:t>LM</a:t>
-            </a:r>
-          </a:p>
-        </p:txBody>
-      </p:sp>
-      <p:sp>
-        <p:nvSpPr>
-          <p:cNvPr id="32" name="TextBox 31"/>
-          <p:cNvSpPr txBox="1"/>
-          <p:nvPr/>
-        </p:nvSpPr>
-        <p:spPr>
-          <a:xfrm>
-            <a:off x="3842214" y="1287263"/>
-            <a:ext cx="401072" cy="278538"/>
-          </a:xfrm>
-          <a:prstGeom prst="rect">
-            <a:avLst/>
-          </a:prstGeom>
-          <a:noFill/>
-        </p:spPr>
-        <p:txBody>
-          <a:bodyPr wrap="none" rtlCol="0">
-            <a:spAutoFit/>
-          </a:bodyPr>
-          <a:lstStyle/>
-          <a:p>
-            <a:r>
-              <a:rPr lang="en-US" dirty="0"/>
-              <a:t>CM</a:t>
-            </a:r>
-          </a:p>
-        </p:txBody>
-      </p:sp>
-      <p:sp>
-        <p:nvSpPr>
-          <p:cNvPr id="33" name="TextBox 32"/>
-          <p:cNvSpPr txBox="1"/>
-          <p:nvPr/>
-        </p:nvSpPr>
-        <p:spPr>
-          <a:xfrm>
-            <a:off x="360045" y="3483594"/>
-            <a:ext cx="390941" cy="278538"/>
-          </a:xfrm>
-          <a:prstGeom prst="rect">
-            <a:avLst/>
-          </a:prstGeom>
-          <a:noFill/>
-        </p:spPr>
-        <p:txBody>
-          <a:bodyPr wrap="none" rtlCol="0">
-            <a:spAutoFit/>
-          </a:bodyPr>
-          <a:lstStyle/>
-          <a:p>
-            <a:r>
-              <a:rPr lang="en-US" dirty="0" smtClean="0"/>
-              <a:t>B,R</a:t>
-            </a:r>
-            <a:endParaRPr lang="en-US" dirty="0"/>
-          </a:p>
-        </p:txBody>
-      </p:sp>
-      <p:sp>
-        <p:nvSpPr>
-          <p:cNvPr id="34" name="TextBox 33"/>
-          <p:cNvSpPr txBox="1"/>
-          <p:nvPr/>
-        </p:nvSpPr>
-        <p:spPr>
-          <a:xfrm>
-            <a:off x="3924487" y="3045869"/>
-            <a:ext cx="284052" cy="278538"/>
-          </a:xfrm>
-          <a:prstGeom prst="rect">
-            <a:avLst/>
-          </a:prstGeom>
-          <a:noFill/>
-        </p:spPr>
-        <p:txBody>
-          <a:bodyPr wrap="none" rtlCol="0">
-            <a:spAutoFit/>
-          </a:bodyPr>
-          <a:lstStyle/>
-          <a:p>
-            <a:r>
-              <a:rPr lang="en-US" dirty="0"/>
-              <a:t>N</a:t>
-            </a:r>
-          </a:p>
-        </p:txBody>
-      </p:sp>
-      <p:sp>
-        <p:nvSpPr>
-          <p:cNvPr id="35" name="TextBox 34"/>
-          <p:cNvSpPr txBox="1"/>
-          <p:nvPr/>
-        </p:nvSpPr>
-        <p:spPr>
-          <a:xfrm>
-            <a:off x="3942922" y="4046396"/>
-            <a:ext cx="260008" cy="278538"/>
-          </a:xfrm>
-          <a:prstGeom prst="rect">
-            <a:avLst/>
-          </a:prstGeom>
-          <a:noFill/>
-        </p:spPr>
-        <p:txBody>
-          <a:bodyPr wrap="none" rtlCol="0">
-            <a:spAutoFit/>
-          </a:bodyPr>
-          <a:lstStyle/>
-          <a:p>
-            <a:r>
-              <a:rPr lang="en-US" dirty="0"/>
-              <a:t>Y</a:t>
-            </a:r>
-          </a:p>
-        </p:txBody>
-      </p:sp>
-      <p:sp>
-        <p:nvSpPr>
-          <p:cNvPr id="36" name="TextBox 35"/>
-          <p:cNvSpPr txBox="1"/>
-          <p:nvPr/>
-        </p:nvSpPr>
-        <p:spPr>
-          <a:xfrm>
-            <a:off x="7696514" y="3483594"/>
-            <a:ext cx="371705" cy="278538"/>
-          </a:xfrm>
-          <a:prstGeom prst="rect">
-            <a:avLst/>
-          </a:prstGeom>
-          <a:noFill/>
-        </p:spPr>
-        <p:txBody>
-          <a:bodyPr wrap="none" rtlCol="0">
-            <a:spAutoFit/>
-          </a:bodyPr>
-          <a:lstStyle/>
-          <a:p>
-            <a:r>
-              <a:rPr lang="en-US" dirty="0" smtClean="0"/>
-              <a:t>B,L</a:t>
-            </a:r>
-            <a:endParaRPr lang="en-US" dirty="0"/>
-          </a:p>
-        </p:txBody>
-      </p:sp>
-      <p:sp>
-        <p:nvSpPr>
-          <p:cNvPr id="37" name="TextBox 36"/>
-          <p:cNvSpPr txBox="1"/>
-          <p:nvPr/>
-        </p:nvSpPr>
-        <p:spPr>
-          <a:xfrm>
-            <a:off x="3932502" y="150497"/>
-            <a:ext cx="274434" cy="278538"/>
-          </a:xfrm>
-          <a:prstGeom prst="rect">
-            <a:avLst/>
-          </a:prstGeom>
-          <a:noFill/>
-        </p:spPr>
-        <p:txBody>
-          <a:bodyPr wrap="none" rtlCol="0">
-            <a:spAutoFit/>
-          </a:bodyPr>
-          <a:lstStyle/>
-          <a:p>
-            <a:r>
-              <a:rPr lang="en-US" dirty="0"/>
-              <a:t>A</a:t>
-            </a:r>
+              <a:rPr lang="en-US" sz="2800" i="1" dirty="0" smtClean="0"/>
+              <a:t>YSA (Yield Sufficiency</a:t>
+            </a:r>
+          </a:p>
+          <a:p>
+            <a:r>
+              <a:rPr lang="en-US" sz="2800" i="1" dirty="0" smtClean="0"/>
+              <a:t>Automaton)</a:t>
+            </a:r>
+            <a:endParaRPr lang="en-US" sz="2800" i="1" dirty="0"/>
           </a:p>
         </p:txBody>
       </p:sp>

</xml_diff>